<commit_message>
:sparkles: update 23/12/19 note
</commit_message>
<xml_diff>
--- a/ppt/算法分析与问题的计算复杂度.pptx
+++ b/ppt/算法分析与问题的计算复杂度.pptx
@@ -243,7 +243,7 @@
           <a:p>
             <a:fld id="{EC13577B-6902-467D-A26C-08A0DD5E4E03}" type="datetimeFigureOut">
               <a:rPr lang="en-US" smtClean="0"/>
-              <a:t>12/14/23</a:t>
+              <a:t>12/17/23</a:t>
             </a:fld>
             <a:endParaRPr lang="en-US"/>
           </a:p>
@@ -1477,7 +1477,7 @@
             <a:fld id="{8BEEBAAA-29B5-4AF5-BC5F-7E580C29002D}" type="datetimeFigureOut">
               <a:rPr lang="en-US" smtClean="0"/>
               <a:pPr/>
-              <a:t>12/14/23</a:t>
+              <a:t>12/17/23</a:t>
             </a:fld>
             <a:endParaRPr lang="en-US"/>
           </a:p>
@@ -2022,7 +2022,7 @@
             <a:fld id="{8BEEBAAA-29B5-4AF5-BC5F-7E580C29002D}" type="datetimeFigureOut">
               <a:rPr lang="en-US" smtClean="0"/>
               <a:pPr/>
-              <a:t>12/14/23</a:t>
+              <a:t>12/17/23</a:t>
             </a:fld>
             <a:endParaRPr lang="en-US" dirty="0"/>
           </a:p>
@@ -2960,7 +2960,7 @@
         </p:nvSpPr>
         <p:spPr>
           <a:xfrm>
-            <a:off x="472249" y="536799"/>
+            <a:off x="530616" y="628239"/>
             <a:ext cx="9819832" cy="753521"/>
           </a:xfrm>
         </p:spPr>

</xml_diff>